<commit_message>
tol plan and poster figs
</commit_message>
<xml_diff>
--- a/Fig1.pptx
+++ b/Fig1.pptx
@@ -254,7 +254,7 @@
           <a:p>
             <a:fld id="{51126369-614B-0B45-85DC-92B11319A204}" type="datetimeFigureOut">
               <a:rPr lang="en-US" smtClean="0"/>
-              <a:t>5/17/19</a:t>
+              <a:t>6/8/19</a:t>
             </a:fld>
             <a:endParaRPr lang="en-US"/>
           </a:p>
@@ -424,7 +424,7 @@
           <a:p>
             <a:fld id="{51126369-614B-0B45-85DC-92B11319A204}" type="datetimeFigureOut">
               <a:rPr lang="en-US" smtClean="0"/>
-              <a:t>5/17/19</a:t>
+              <a:t>6/8/19</a:t>
             </a:fld>
             <a:endParaRPr lang="en-US"/>
           </a:p>
@@ -604,7 +604,7 @@
           <a:p>
             <a:fld id="{51126369-614B-0B45-85DC-92B11319A204}" type="datetimeFigureOut">
               <a:rPr lang="en-US" smtClean="0"/>
-              <a:t>5/17/19</a:t>
+              <a:t>6/8/19</a:t>
             </a:fld>
             <a:endParaRPr lang="en-US"/>
           </a:p>
@@ -774,7 +774,7 @@
           <a:p>
             <a:fld id="{51126369-614B-0B45-85DC-92B11319A204}" type="datetimeFigureOut">
               <a:rPr lang="en-US" smtClean="0"/>
-              <a:t>5/17/19</a:t>
+              <a:t>6/8/19</a:t>
             </a:fld>
             <a:endParaRPr lang="en-US"/>
           </a:p>
@@ -1020,7 +1020,7 @@
           <a:p>
             <a:fld id="{51126369-614B-0B45-85DC-92B11319A204}" type="datetimeFigureOut">
               <a:rPr lang="en-US" smtClean="0"/>
-              <a:t>5/17/19</a:t>
+              <a:t>6/8/19</a:t>
             </a:fld>
             <a:endParaRPr lang="en-US"/>
           </a:p>
@@ -1252,7 +1252,7 @@
           <a:p>
             <a:fld id="{51126369-614B-0B45-85DC-92B11319A204}" type="datetimeFigureOut">
               <a:rPr lang="en-US" smtClean="0"/>
-              <a:t>5/17/19</a:t>
+              <a:t>6/8/19</a:t>
             </a:fld>
             <a:endParaRPr lang="en-US"/>
           </a:p>
@@ -1619,7 +1619,7 @@
           <a:p>
             <a:fld id="{51126369-614B-0B45-85DC-92B11319A204}" type="datetimeFigureOut">
               <a:rPr lang="en-US" smtClean="0"/>
-              <a:t>5/17/19</a:t>
+              <a:t>6/8/19</a:t>
             </a:fld>
             <a:endParaRPr lang="en-US"/>
           </a:p>
@@ -1737,7 +1737,7 @@
           <a:p>
             <a:fld id="{51126369-614B-0B45-85DC-92B11319A204}" type="datetimeFigureOut">
               <a:rPr lang="en-US" smtClean="0"/>
-              <a:t>5/17/19</a:t>
+              <a:t>6/8/19</a:t>
             </a:fld>
             <a:endParaRPr lang="en-US"/>
           </a:p>
@@ -1832,7 +1832,7 @@
           <a:p>
             <a:fld id="{51126369-614B-0B45-85DC-92B11319A204}" type="datetimeFigureOut">
               <a:rPr lang="en-US" smtClean="0"/>
-              <a:t>5/17/19</a:t>
+              <a:t>6/8/19</a:t>
             </a:fld>
             <a:endParaRPr lang="en-US"/>
           </a:p>
@@ -2109,7 +2109,7 @@
           <a:p>
             <a:fld id="{51126369-614B-0B45-85DC-92B11319A204}" type="datetimeFigureOut">
               <a:rPr lang="en-US" smtClean="0"/>
-              <a:t>5/17/19</a:t>
+              <a:t>6/8/19</a:t>
             </a:fld>
             <a:endParaRPr lang="en-US"/>
           </a:p>
@@ -2366,7 +2366,7 @@
           <a:p>
             <a:fld id="{51126369-614B-0B45-85DC-92B11319A204}" type="datetimeFigureOut">
               <a:rPr lang="en-US" smtClean="0"/>
-              <a:t>5/17/19</a:t>
+              <a:t>6/8/19</a:t>
             </a:fld>
             <a:endParaRPr lang="en-US"/>
           </a:p>
@@ -2579,7 +2579,7 @@
           <a:p>
             <a:fld id="{51126369-614B-0B45-85DC-92B11319A204}" type="datetimeFigureOut">
               <a:rPr lang="en-US" smtClean="0"/>
-              <a:t>5/17/19</a:t>
+              <a:t>6/8/19</a:t>
             </a:fld>
             <a:endParaRPr lang="en-US"/>
           </a:p>
@@ -2998,8 +2998,8 @@
         </p:nvSpPr>
         <p:spPr>
           <a:xfrm>
-            <a:off x="4677768" y="22666"/>
-            <a:ext cx="6235040" cy="1754326"/>
+            <a:off x="4397352" y="22666"/>
+            <a:ext cx="6670416" cy="1754326"/>
           </a:xfrm>
           <a:prstGeom prst="rect">
             <a:avLst/>
@@ -3013,7 +3013,11 @@
           <a:lstStyle/>
           <a:p>
             <a:r>
-              <a:rPr lang="en-US" sz="1800" b="1" dirty="0"/>
+              <a:rPr lang="en-US" sz="1800" b="1" dirty="0">
+                <a:latin typeface="Helvetica Neue" panose="02000503000000020004" pitchFamily="2" charset="0"/>
+                <a:ea typeface="Helvetica Neue" panose="02000503000000020004" pitchFamily="2" charset="0"/>
+                <a:cs typeface="Helvetica Neue" panose="02000503000000020004" pitchFamily="2" charset="0"/>
+              </a:rPr>
               <a:t>  Source data (peer reviewed and curated)</a:t>
             </a:r>
           </a:p>
@@ -3023,8 +3027,12 @@
               <a:buChar char="•"/>
             </a:pPr>
             <a:r>
-              <a:rPr lang="en-US" sz="1800" dirty="0"/>
-              <a:t>All source chronograms</a:t>
+              <a:rPr lang="en-US" sz="1800" dirty="0">
+                <a:latin typeface="Helvetica Neue" panose="02000503000000020004" pitchFamily="2" charset="0"/>
+                <a:ea typeface="Helvetica Neue" panose="02000503000000020004" pitchFamily="2" charset="0"/>
+                <a:cs typeface="Helvetica Neue" panose="02000503000000020004" pitchFamily="2" charset="0"/>
+              </a:rPr>
+              <a:t> All source chronograms</a:t>
             </a:r>
           </a:p>
           <a:p>
@@ -3033,7 +3041,11 @@
               <a:buChar char="•"/>
             </a:pPr>
             <a:r>
-              <a:rPr lang="en-US" sz="1800" dirty="0"/>
+              <a:rPr lang="en-US" sz="1800" dirty="0">
+                <a:latin typeface="Helvetica Neue" panose="02000503000000020004" pitchFamily="2" charset="0"/>
+                <a:ea typeface="Helvetica Neue" panose="02000503000000020004" pitchFamily="2" charset="0"/>
+                <a:cs typeface="Helvetica Neue" panose="02000503000000020004" pitchFamily="2" charset="0"/>
+              </a:rPr>
               <a:t> All original study citations</a:t>
             </a:r>
           </a:p>
@@ -3043,11 +3055,27 @@
               <a:buChar char="•"/>
             </a:pPr>
             <a:r>
-              <a:rPr lang="en-US" sz="1800" dirty="0" err="1"/>
+              <a:rPr lang="en-US" sz="1800" dirty="0">
+                <a:latin typeface="Helvetica Neue" panose="02000503000000020004" pitchFamily="2" charset="0"/>
+                <a:ea typeface="Helvetica Neue" panose="02000503000000020004" pitchFamily="2" charset="0"/>
+                <a:cs typeface="Helvetica Neue" panose="02000503000000020004" pitchFamily="2" charset="0"/>
+              </a:rPr>
+              <a:t> </a:t>
+            </a:r>
+            <a:r>
+              <a:rPr lang="en-US" sz="1800" dirty="0" err="1">
+                <a:latin typeface="Helvetica Neue" panose="02000503000000020004" pitchFamily="2" charset="0"/>
+                <a:ea typeface="Helvetica Neue" panose="02000503000000020004" pitchFamily="2" charset="0"/>
+                <a:cs typeface="Helvetica Neue" panose="02000503000000020004" pitchFamily="2" charset="0"/>
+              </a:rPr>
               <a:t>Mrca</a:t>
             </a:r>
             <a:r>
-              <a:rPr lang="en-US" sz="1800" dirty="0"/>
+              <a:rPr lang="en-US" sz="1800" dirty="0">
+                <a:latin typeface="Helvetica Neue" panose="02000503000000020004" pitchFamily="2" charset="0"/>
+                <a:ea typeface="Helvetica Neue" panose="02000503000000020004" pitchFamily="2" charset="0"/>
+                <a:cs typeface="Helvetica Neue" panose="02000503000000020004" pitchFamily="2" charset="0"/>
+              </a:rPr>
               <a:t> ages of each source chronogram</a:t>
             </a:r>
           </a:p>
@@ -3057,8 +3085,12 @@
               <a:buChar char="•"/>
             </a:pPr>
             <a:r>
-              <a:rPr lang="en-US" sz="1800" dirty="0"/>
-              <a:t>A single summary tree of source chronograms</a:t>
+              <a:rPr lang="en-US" sz="1800" dirty="0">
+                <a:latin typeface="Helvetica Neue" panose="02000503000000020004" pitchFamily="2" charset="0"/>
+                <a:ea typeface="Helvetica Neue" panose="02000503000000020004" pitchFamily="2" charset="0"/>
+                <a:cs typeface="Helvetica Neue" panose="02000503000000020004" pitchFamily="2" charset="0"/>
+              </a:rPr>
+              <a:t> A single summary tree of source chronograms</a:t>
             </a:r>
           </a:p>
           <a:p>
@@ -3067,7 +3099,11 @@
               <a:buChar char="•"/>
             </a:pPr>
             <a:r>
-              <a:rPr lang="en-US" sz="1800" dirty="0"/>
+              <a:rPr lang="en-US" sz="1800" dirty="0">
+                <a:latin typeface="Helvetica Neue" panose="02000503000000020004" pitchFamily="2" charset="0"/>
+                <a:ea typeface="Helvetica Neue" panose="02000503000000020004" pitchFamily="2" charset="0"/>
+                <a:cs typeface="Helvetica Neue" panose="02000503000000020004" pitchFamily="2" charset="0"/>
+              </a:rPr>
               <a:t>A summary of successful hits per input name</a:t>
             </a:r>
           </a:p>
@@ -3128,7 +3164,11 @@
           <a:lstStyle/>
           <a:p>
             <a:pPr algn="ctr"/>
-            <a:endParaRPr lang="en-US" dirty="0"/>
+            <a:endParaRPr lang="en-US" dirty="0">
+              <a:latin typeface="Helvetica Neue" panose="02000503000000020004" pitchFamily="2" charset="0"/>
+              <a:ea typeface="Helvetica Neue" panose="02000503000000020004" pitchFamily="2" charset="0"/>
+              <a:cs typeface="Helvetica Neue" panose="02000503000000020004" pitchFamily="2" charset="0"/>
+            </a:endParaRPr>
           </a:p>
         </p:txBody>
       </p:sp>
@@ -3185,7 +3225,11 @@
           <a:lstStyle/>
           <a:p>
             <a:pPr algn="ctr"/>
-            <a:endParaRPr lang="en-US" dirty="0"/>
+            <a:endParaRPr lang="en-US" dirty="0">
+              <a:latin typeface="Helvetica Neue" panose="02000503000000020004" pitchFamily="2" charset="0"/>
+              <a:ea typeface="Helvetica Neue" panose="02000503000000020004" pitchFamily="2" charset="0"/>
+              <a:cs typeface="Helvetica Neue" panose="02000503000000020004" pitchFamily="2" charset="0"/>
+            </a:endParaRPr>
           </a:p>
         </p:txBody>
       </p:sp>
@@ -3211,7 +3255,7 @@
         </p:blipFill>
         <p:spPr>
           <a:xfrm>
-            <a:off x="2952756" y="2181317"/>
+            <a:off x="2806452" y="2181317"/>
             <a:ext cx="2404336" cy="1123766"/>
           </a:xfrm>
           <a:prstGeom prst="rect">
@@ -3233,8 +3277,8 @@
         </p:nvSpPr>
         <p:spPr>
           <a:xfrm>
-            <a:off x="508525" y="1667333"/>
-            <a:ext cx="1544590" cy="646331"/>
+            <a:off x="277711" y="1667333"/>
+            <a:ext cx="1747594" cy="646331"/>
           </a:xfrm>
           <a:prstGeom prst="rect">
             <a:avLst/>
@@ -3249,21 +3293,37 @@
           <a:p>
             <a:pPr algn="ctr"/>
             <a:r>
-              <a:rPr lang="en-US" sz="1800" dirty="0"/>
+              <a:rPr lang="en-US" sz="1800" dirty="0">
+                <a:latin typeface="Helvetica Neue" panose="02000503000000020004" pitchFamily="2" charset="0"/>
+                <a:ea typeface="Helvetica Neue" panose="02000503000000020004" pitchFamily="2" charset="0"/>
+                <a:cs typeface="Helvetica Neue" panose="02000503000000020004" pitchFamily="2" charset="0"/>
+              </a:rPr>
               <a:t>A </a:t>
             </a:r>
             <a:r>
-              <a:rPr lang="en-US" sz="1800" b="1" dirty="0"/>
+              <a:rPr lang="en-US" sz="1800" b="1" dirty="0">
+                <a:latin typeface="Helvetica Neue" panose="02000503000000020004" pitchFamily="2" charset="0"/>
+                <a:ea typeface="Helvetica Neue" panose="02000503000000020004" pitchFamily="2" charset="0"/>
+                <a:cs typeface="Helvetica Neue" panose="02000503000000020004" pitchFamily="2" charset="0"/>
+              </a:rPr>
               <a:t>list of taxon </a:t>
             </a:r>
           </a:p>
           <a:p>
             <a:pPr algn="ctr"/>
             <a:r>
-              <a:rPr lang="en-US" sz="1800" b="1" dirty="0"/>
+              <a:rPr lang="en-US" sz="1800" b="1" dirty="0">
+                <a:latin typeface="Helvetica Neue" panose="02000503000000020004" pitchFamily="2" charset="0"/>
+                <a:ea typeface="Helvetica Neue" panose="02000503000000020004" pitchFamily="2" charset="0"/>
+                <a:cs typeface="Helvetica Neue" panose="02000503000000020004" pitchFamily="2" charset="0"/>
+              </a:rPr>
               <a:t>names</a:t>
             </a:r>
-            <a:endParaRPr lang="en-US" sz="1800" dirty="0"/>
+            <a:endParaRPr lang="en-US" sz="1800" dirty="0">
+              <a:latin typeface="Helvetica Neue" panose="02000503000000020004" pitchFamily="2" charset="0"/>
+              <a:ea typeface="Helvetica Neue" panose="02000503000000020004" pitchFamily="2" charset="0"/>
+              <a:cs typeface="Helvetica Neue" panose="02000503000000020004" pitchFamily="2" charset="0"/>
+            </a:endParaRPr>
           </a:p>
         </p:txBody>
       </p:sp>
@@ -3281,8 +3341,8 @@
         </p:nvSpPr>
         <p:spPr>
           <a:xfrm>
-            <a:off x="153478" y="3034881"/>
-            <a:ext cx="1996060" cy="646331"/>
+            <a:off x="1995" y="3034881"/>
+            <a:ext cx="2299027" cy="646331"/>
           </a:xfrm>
           <a:prstGeom prst="rect">
             <a:avLst/>
@@ -3297,26 +3357,46 @@
           <a:p>
             <a:pPr algn="ctr"/>
             <a:r>
-              <a:rPr lang="en-US" sz="1800" dirty="0"/>
+              <a:rPr lang="en-US" sz="1800" dirty="0">
+                <a:latin typeface="Helvetica Neue" panose="02000503000000020004" pitchFamily="2" charset="0"/>
+                <a:ea typeface="Helvetica Neue" panose="02000503000000020004" pitchFamily="2" charset="0"/>
+                <a:cs typeface="Helvetica Neue" panose="02000503000000020004" pitchFamily="2" charset="0"/>
+              </a:rPr>
               <a:t>A </a:t>
             </a:r>
             <a:r>
-              <a:rPr lang="en-US" sz="1800" b="1" dirty="0"/>
+              <a:rPr lang="en-US" sz="1800" b="1" dirty="0">
+                <a:latin typeface="Helvetica Neue" panose="02000503000000020004" pitchFamily="2" charset="0"/>
+                <a:ea typeface="Helvetica Neue" panose="02000503000000020004" pitchFamily="2" charset="0"/>
+                <a:cs typeface="Helvetica Neue" panose="02000503000000020004" pitchFamily="2" charset="0"/>
+              </a:rPr>
               <a:t>tree</a:t>
             </a:r>
             <a:r>
-              <a:rPr lang="en-US" sz="1800" dirty="0"/>
+              <a:rPr lang="en-US" sz="1800" dirty="0">
+                <a:latin typeface="Helvetica Neue" panose="02000503000000020004" pitchFamily="2" charset="0"/>
+                <a:ea typeface="Helvetica Neue" panose="02000503000000020004" pitchFamily="2" charset="0"/>
+                <a:cs typeface="Helvetica Neue" panose="02000503000000020004" pitchFamily="2" charset="0"/>
+              </a:rPr>
               <a:t> with </a:t>
             </a:r>
             <a:r>
-              <a:rPr lang="en-US" sz="1800" b="1" dirty="0"/>
+              <a:rPr lang="en-US" sz="1800" b="1" dirty="0">
+                <a:latin typeface="Helvetica Neue" panose="02000503000000020004" pitchFamily="2" charset="0"/>
+                <a:ea typeface="Helvetica Neue" panose="02000503000000020004" pitchFamily="2" charset="0"/>
+                <a:cs typeface="Helvetica Neue" panose="02000503000000020004" pitchFamily="2" charset="0"/>
+              </a:rPr>
               <a:t>taxon </a:t>
             </a:r>
           </a:p>
           <a:p>
             <a:pPr algn="ctr"/>
             <a:r>
-              <a:rPr lang="en-US" sz="1800" b="1" dirty="0"/>
+              <a:rPr lang="en-US" sz="1800" b="1" dirty="0">
+                <a:latin typeface="Helvetica Neue" panose="02000503000000020004" pitchFamily="2" charset="0"/>
+                <a:ea typeface="Helvetica Neue" panose="02000503000000020004" pitchFamily="2" charset="0"/>
+                <a:cs typeface="Helvetica Neue" panose="02000503000000020004" pitchFamily="2" charset="0"/>
+              </a:rPr>
               <a:t>names as tip labels</a:t>
             </a:r>
           </a:p>
@@ -3336,7 +3416,7 @@
         </p:nvSpPr>
         <p:spPr>
           <a:xfrm>
-            <a:off x="6412205" y="2004925"/>
+            <a:off x="6131789" y="2004925"/>
             <a:ext cx="4631178" cy="1477328"/>
           </a:xfrm>
           <a:prstGeom prst="rect">
@@ -3351,7 +3431,11 @@
           <a:lstStyle/>
           <a:p>
             <a:r>
-              <a:rPr lang="en-US" sz="1800" b="1" dirty="0"/>
+              <a:rPr lang="en-US" sz="1800" b="1" dirty="0">
+                <a:latin typeface="Helvetica Neue" panose="02000503000000020004" pitchFamily="2" charset="0"/>
+                <a:ea typeface="Helvetica Neue" panose="02000503000000020004" pitchFamily="2" charset="0"/>
+                <a:cs typeface="Helvetica Neue" panose="02000503000000020004" pitchFamily="2" charset="0"/>
+              </a:rPr>
               <a:t>  Original data</a:t>
             </a:r>
           </a:p>
@@ -3361,8 +3445,12 @@
               <a:buChar char="•"/>
             </a:pPr>
             <a:r>
-              <a:rPr lang="en-US" sz="1800" dirty="0"/>
-              <a:t>A single chronogram calibrated with all source chronogram data</a:t>
+              <a:rPr lang="en-US" sz="1800" dirty="0">
+                <a:latin typeface="Helvetica Neue" panose="02000503000000020004" pitchFamily="2" charset="0"/>
+                <a:ea typeface="Helvetica Neue" panose="02000503000000020004" pitchFamily="2" charset="0"/>
+                <a:cs typeface="Helvetica Neue" panose="02000503000000020004" pitchFamily="2" charset="0"/>
+              </a:rPr>
+              <a:t> A single chronogram calibrated with all source chronogram data</a:t>
             </a:r>
           </a:p>
           <a:p>
@@ -3371,8 +3459,12 @@
               <a:buChar char="•"/>
             </a:pPr>
             <a:r>
-              <a:rPr lang="en-US" sz="1800" dirty="0"/>
-              <a:t>A chronogram calibrated with data from a subset of source chronogram data</a:t>
+              <a:rPr lang="en-US" sz="1800" dirty="0">
+                <a:latin typeface="Helvetica Neue" panose="02000503000000020004" pitchFamily="2" charset="0"/>
+                <a:ea typeface="Helvetica Neue" panose="02000503000000020004" pitchFamily="2" charset="0"/>
+                <a:cs typeface="Helvetica Neue" panose="02000503000000020004" pitchFamily="2" charset="0"/>
+              </a:rPr>
+              <a:t> A chronogram calibrated with data from a subset of source chronogram data</a:t>
             </a:r>
           </a:p>
         </p:txBody>
@@ -3393,7 +3485,7 @@
         </p:nvCxnSpPr>
         <p:spPr>
           <a:xfrm flipH="1">
-            <a:off x="2104930" y="2974474"/>
+            <a:off x="2226850" y="2974474"/>
             <a:ext cx="527331" cy="375557"/>
           </a:xfrm>
           <a:prstGeom prst="straightConnector1">
@@ -3441,7 +3533,7 @@
         </p:nvCxnSpPr>
         <p:spPr>
           <a:xfrm flipH="1" flipV="1">
-            <a:off x="2108552" y="2073949"/>
+            <a:off x="2181704" y="2073949"/>
             <a:ext cx="514575" cy="382924"/>
           </a:xfrm>
           <a:prstGeom prst="straightConnector1">
@@ -3489,7 +3581,7 @@
         </p:nvCxnSpPr>
         <p:spPr>
           <a:xfrm flipH="1">
-            <a:off x="5364021" y="2734163"/>
+            <a:off x="5083605" y="2734163"/>
             <a:ext cx="1048184" cy="0"/>
           </a:xfrm>
           <a:prstGeom prst="straightConnector1">
@@ -3532,14 +3624,13 @@
           </p:cNvPr>
           <p:cNvCxnSpPr>
             <a:cxnSpLocks/>
-            <a:stCxn id="22" idx="1"/>
           </p:cNvCxnSpPr>
           <p:nvPr/>
         </p:nvCxnSpPr>
         <p:spPr>
           <a:xfrm flipH="1" flipV="1">
-            <a:off x="4675036" y="4052890"/>
-            <a:ext cx="963864" cy="534418"/>
+            <a:off x="4748684" y="3464471"/>
+            <a:ext cx="737716" cy="637100"/>
           </a:xfrm>
           <a:prstGeom prst="straightConnector1">
             <a:avLst/>
@@ -3592,8 +3683,8 @@
         </p:nvCxnSpPr>
         <p:spPr>
           <a:xfrm flipH="1">
-            <a:off x="4645891" y="858982"/>
-            <a:ext cx="840509" cy="701963"/>
+            <a:off x="4768190" y="1407622"/>
+            <a:ext cx="718212" cy="750480"/>
           </a:xfrm>
           <a:prstGeom prst="straightConnector1">
             <a:avLst/>
@@ -3644,8 +3735,8 @@
         </p:nvSpPr>
         <p:spPr>
           <a:xfrm>
-            <a:off x="5638900" y="3848644"/>
-            <a:ext cx="5130700" cy="1477328"/>
+            <a:off x="5358484" y="3848644"/>
+            <a:ext cx="5709284" cy="1477328"/>
           </a:xfrm>
           <a:prstGeom prst="rect">
             <a:avLst/>
@@ -3659,8 +3750,12 @@
           <a:lstStyle/>
           <a:p>
             <a:r>
-              <a:rPr lang="en-US" sz="1800" b="1" dirty="0"/>
-              <a:t>              Simulated data of missing-from-source taxa</a:t>
+              <a:rPr lang="en-US" sz="1800" b="1" dirty="0">
+                <a:latin typeface="Helvetica Neue" panose="02000503000000020004" pitchFamily="2" charset="0"/>
+                <a:ea typeface="Helvetica Neue" panose="02000503000000020004" pitchFamily="2" charset="0"/>
+                <a:cs typeface="Helvetica Neue" panose="02000503000000020004" pitchFamily="2" charset="0"/>
+              </a:rPr>
+              <a:t>              Simulated data</a:t>
             </a:r>
           </a:p>
           <a:p>
@@ -3669,14 +3764,22 @@
               <a:buChar char="•"/>
             </a:pPr>
             <a:r>
-              <a:rPr lang="en-US" sz="1800" dirty="0"/>
-              <a:t>All source chronograms with simulated tips and</a:t>
+              <a:rPr lang="en-US" sz="1800" dirty="0">
+                <a:latin typeface="Helvetica Neue" panose="02000503000000020004" pitchFamily="2" charset="0"/>
+                <a:ea typeface="Helvetica Neue" panose="02000503000000020004" pitchFamily="2" charset="0"/>
+                <a:cs typeface="Helvetica Neue" panose="02000503000000020004" pitchFamily="2" charset="0"/>
+              </a:rPr>
+              <a:t> All source chronograms with simulated tips and</a:t>
             </a:r>
           </a:p>
           <a:p>
             <a:pPr marL="293688"/>
             <a:r>
-              <a:rPr lang="en-US" sz="1800" dirty="0"/>
+              <a:rPr lang="en-US" sz="1800" dirty="0">
+                <a:latin typeface="Helvetica Neue" panose="02000503000000020004" pitchFamily="2" charset="0"/>
+                <a:ea typeface="Helvetica Neue" panose="02000503000000020004" pitchFamily="2" charset="0"/>
+                <a:cs typeface="Helvetica Neue" panose="02000503000000020004" pitchFamily="2" charset="0"/>
+              </a:rPr>
               <a:t>ages of divergence of missing-from-source taxa </a:t>
             </a:r>
           </a:p>
@@ -3686,8 +3789,12 @@
               <a:buChar char="•"/>
             </a:pPr>
             <a:r>
-              <a:rPr lang="en-US" sz="1800" dirty="0"/>
-              <a:t>A summary tree of source chronograms with simulated tips and ages of missing-from-source taxa</a:t>
+              <a:rPr lang="en-US" sz="1800" dirty="0">
+                <a:latin typeface="Helvetica Neue" panose="02000503000000020004" pitchFamily="2" charset="0"/>
+                <a:ea typeface="Helvetica Neue" panose="02000503000000020004" pitchFamily="2" charset="0"/>
+                <a:cs typeface="Helvetica Neue" panose="02000503000000020004" pitchFamily="2" charset="0"/>
+              </a:rPr>
+              <a:t> A summary tree of source chronograms with simulated tips and ages of missing-from-source taxa</a:t>
             </a:r>
           </a:p>
         </p:txBody>

</xml_diff>